<commit_message>
Update DevFest DC AWS EKS Cluster QuickStart slides
</commit_message>
<xml_diff>
--- a/slides/DevFestDC-AWS-EKS-Cluster-Quickstart.pptx
+++ b/slides/DevFestDC-AWS-EKS-Cluster-Quickstart.pptx
@@ -5,10 +5,10 @@
     <p:sldMasterId id="2147483852" r:id="rId1"/>
   </p:sldMasterIdLst>
   <p:notesMasterIdLst>
-    <p:notesMasterId r:id="rId10"/>
+    <p:notesMasterId r:id="rId12"/>
   </p:notesMasterIdLst>
   <p:handoutMasterIdLst>
-    <p:handoutMasterId r:id="rId11"/>
+    <p:handoutMasterId r:id="rId13"/>
   </p:handoutMasterIdLst>
   <p:sldIdLst>
     <p:sldId id="256" r:id="rId2"/>
@@ -18,7 +18,9 @@
     <p:sldId id="267" r:id="rId6"/>
     <p:sldId id="269" r:id="rId7"/>
     <p:sldId id="262" r:id="rId8"/>
-    <p:sldId id="265" r:id="rId9"/>
+    <p:sldId id="272" r:id="rId9"/>
+    <p:sldId id="271" r:id="rId10"/>
+    <p:sldId id="265" r:id="rId11"/>
   </p:sldIdLst>
   <p:sldSz cx="9144000" cy="6858000" type="screen4x3"/>
   <p:notesSz cx="6858000" cy="9144000"/>
@@ -203,7 +205,7 @@
             <a:fld id="{814910AB-AEF0-414C-82CB-791080B1186B}" type="datetimeFigureOut">
               <a:rPr lang="en-US" smtClean="0"/>
               <a:pPr/>
-              <a:t>6/13/2019</a:t>
+              <a:t>6/14/2019</a:t>
             </a:fld>
             <a:endParaRPr lang="en-US" dirty="0"/>
           </a:p>
@@ -370,7 +372,7 @@
             <a:fld id="{5B4AE38D-E020-46F3-803D-8636C5B7B74E}" type="datetimeFigureOut">
               <a:rPr lang="en-US" smtClean="0"/>
               <a:pPr/>
-              <a:t>6/13/2019</a:t>
+              <a:t>6/14/2019</a:t>
             </a:fld>
             <a:endParaRPr lang="en-US" dirty="0"/>
           </a:p>
@@ -766,6 +768,256 @@
 </p:notes>
 </file>
 
+<file path=ppt/notesSlides/notesSlide2.xml><?xml version="1.0" encoding="utf-8"?>
+<p:notes xmlns:a="http://schemas.openxmlformats.org/drawingml/2006/main" xmlns:r="http://schemas.openxmlformats.org/officeDocument/2006/relationships" xmlns:p="http://schemas.openxmlformats.org/presentationml/2006/main">
+  <p:cSld>
+    <p:spTree>
+      <p:nvGrpSpPr>
+        <p:cNvPr id="1" name=""/>
+        <p:cNvGrpSpPr/>
+        <p:nvPr/>
+      </p:nvGrpSpPr>
+      <p:grpSpPr>
+        <a:xfrm>
+          <a:off x="0" y="0"/>
+          <a:ext cx="0" cy="0"/>
+          <a:chOff x="0" y="0"/>
+          <a:chExt cx="0" cy="0"/>
+        </a:xfrm>
+      </p:grpSpPr>
+      <p:sp>
+        <p:nvSpPr>
+          <p:cNvPr id="2" name="Slide Image Placeholder 1"/>
+          <p:cNvSpPr>
+            <a:spLocks noGrp="1" noRot="1" noChangeAspect="1"/>
+          </p:cNvSpPr>
+          <p:nvPr>
+            <p:ph type="sldImg"/>
+          </p:nvPr>
+        </p:nvSpPr>
+        <p:spPr/>
+      </p:sp>
+      <p:sp>
+        <p:nvSpPr>
+          <p:cNvPr id="3" name="Notes Placeholder 2"/>
+          <p:cNvSpPr>
+            <a:spLocks noGrp="1"/>
+          </p:cNvSpPr>
+          <p:nvPr>
+            <p:ph type="body" idx="1"/>
+          </p:nvPr>
+        </p:nvSpPr>
+        <p:spPr/>
+        <p:txBody>
+          <a:bodyPr>
+            <a:normAutofit/>
+          </a:bodyPr>
+          <a:lstStyle/>
+          <a:p>
+            <a:pPr marL="228600" indent="-228600">
+              <a:buAutoNum type="arabicPeriod"/>
+            </a:pPr>
+            <a:r>
+              <a:rPr lang="en-US" dirty="0" smtClean="0"/>
+              <a:t>Send a simple text message</a:t>
+            </a:r>
+          </a:p>
+          <a:p>
+            <a:pPr marL="228600" indent="-228600">
+              <a:buAutoNum type="arabicPeriod" startAt="2"/>
+            </a:pPr>
+            <a:r>
+              <a:rPr lang="en-US" dirty="0" smtClean="0"/>
+              <a:t>Use representative website</a:t>
+            </a:r>
+          </a:p>
+          <a:p>
+            <a:pPr marL="228600" indent="-228600">
+              <a:buAutoNum type="arabicPeriod" startAt="2"/>
+            </a:pPr>
+            <a:r>
+              <a:rPr lang="en-US" dirty="0" smtClean="0"/>
+              <a:t>Use</a:t>
+            </a:r>
+            <a:r>
+              <a:rPr lang="en-US" baseline="0" dirty="0" smtClean="0"/>
+              <a:t> </a:t>
+            </a:r>
+            <a:r>
+              <a:rPr lang="en-US" dirty="0" smtClean="0"/>
+              <a:t>phone dialer</a:t>
+            </a:r>
+            <a:endParaRPr lang="en-US" baseline="0" dirty="0" smtClean="0"/>
+          </a:p>
+          <a:p>
+            <a:pPr marL="228600" indent="-228600">
+              <a:buAutoNum type="arabicPeriod" startAt="2"/>
+            </a:pPr>
+            <a:r>
+              <a:rPr lang="en-US" baseline="0" dirty="0" smtClean="0"/>
+              <a:t>Use web browser</a:t>
+            </a:r>
+            <a:endParaRPr lang="en-US" dirty="0"/>
+          </a:p>
+        </p:txBody>
+      </p:sp>
+      <p:sp>
+        <p:nvSpPr>
+          <p:cNvPr id="4" name="Slide Number Placeholder 3"/>
+          <p:cNvSpPr>
+            <a:spLocks noGrp="1"/>
+          </p:cNvSpPr>
+          <p:nvPr>
+            <p:ph type="sldNum" sz="quarter" idx="10"/>
+          </p:nvPr>
+        </p:nvSpPr>
+        <p:spPr/>
+        <p:txBody>
+          <a:bodyPr/>
+          <a:lstStyle/>
+          <a:p>
+            <a:fld id="{74DE7DC8-A302-4EFB-9208-987A80C71CE4}" type="slidenum">
+              <a:rPr lang="en-US" smtClean="0"/>
+              <a:pPr/>
+              <a:t>8</a:t>
+            </a:fld>
+            <a:endParaRPr lang="en-US" dirty="0"/>
+          </a:p>
+        </p:txBody>
+      </p:sp>
+    </p:spTree>
+  </p:cSld>
+  <p:clrMapOvr>
+    <a:masterClrMapping/>
+  </p:clrMapOvr>
+</p:notes>
+</file>
+
+<file path=ppt/notesSlides/notesSlide3.xml><?xml version="1.0" encoding="utf-8"?>
+<p:notes xmlns:a="http://schemas.openxmlformats.org/drawingml/2006/main" xmlns:r="http://schemas.openxmlformats.org/officeDocument/2006/relationships" xmlns:p="http://schemas.openxmlformats.org/presentationml/2006/main">
+  <p:cSld>
+    <p:spTree>
+      <p:nvGrpSpPr>
+        <p:cNvPr id="1" name=""/>
+        <p:cNvGrpSpPr/>
+        <p:nvPr/>
+      </p:nvGrpSpPr>
+      <p:grpSpPr>
+        <a:xfrm>
+          <a:off x="0" y="0"/>
+          <a:ext cx="0" cy="0"/>
+          <a:chOff x="0" y="0"/>
+          <a:chExt cx="0" cy="0"/>
+        </a:xfrm>
+      </p:grpSpPr>
+      <p:sp>
+        <p:nvSpPr>
+          <p:cNvPr id="2" name="Slide Image Placeholder 1"/>
+          <p:cNvSpPr>
+            <a:spLocks noGrp="1" noRot="1" noChangeAspect="1"/>
+          </p:cNvSpPr>
+          <p:nvPr>
+            <p:ph type="sldImg"/>
+          </p:nvPr>
+        </p:nvSpPr>
+        <p:spPr/>
+      </p:sp>
+      <p:sp>
+        <p:nvSpPr>
+          <p:cNvPr id="3" name="Notes Placeholder 2"/>
+          <p:cNvSpPr>
+            <a:spLocks noGrp="1"/>
+          </p:cNvSpPr>
+          <p:nvPr>
+            <p:ph type="body" idx="1"/>
+          </p:nvPr>
+        </p:nvSpPr>
+        <p:spPr/>
+        <p:txBody>
+          <a:bodyPr>
+            <a:normAutofit/>
+          </a:bodyPr>
+          <a:lstStyle/>
+          <a:p>
+            <a:pPr marL="228600" indent="-228600">
+              <a:buAutoNum type="arabicPeriod"/>
+            </a:pPr>
+            <a:r>
+              <a:rPr lang="en-US" dirty="0" smtClean="0"/>
+              <a:t>Send a simple text message</a:t>
+            </a:r>
+          </a:p>
+          <a:p>
+            <a:pPr marL="228600" indent="-228600">
+              <a:buAutoNum type="arabicPeriod" startAt="2"/>
+            </a:pPr>
+            <a:r>
+              <a:rPr lang="en-US" dirty="0" smtClean="0"/>
+              <a:t>Use representative website</a:t>
+            </a:r>
+          </a:p>
+          <a:p>
+            <a:pPr marL="228600" indent="-228600">
+              <a:buAutoNum type="arabicPeriod" startAt="2"/>
+            </a:pPr>
+            <a:r>
+              <a:rPr lang="en-US" dirty="0" smtClean="0"/>
+              <a:t>Use</a:t>
+            </a:r>
+            <a:r>
+              <a:rPr lang="en-US" baseline="0" dirty="0" smtClean="0"/>
+              <a:t> </a:t>
+            </a:r>
+            <a:r>
+              <a:rPr lang="en-US" dirty="0" smtClean="0"/>
+              <a:t>phone dialer</a:t>
+            </a:r>
+            <a:endParaRPr lang="en-US" baseline="0" dirty="0" smtClean="0"/>
+          </a:p>
+          <a:p>
+            <a:pPr marL="228600" indent="-228600">
+              <a:buAutoNum type="arabicPeriod" startAt="2"/>
+            </a:pPr>
+            <a:r>
+              <a:rPr lang="en-US" baseline="0" dirty="0" smtClean="0"/>
+              <a:t>Use web browser</a:t>
+            </a:r>
+            <a:endParaRPr lang="en-US" dirty="0"/>
+          </a:p>
+        </p:txBody>
+      </p:sp>
+      <p:sp>
+        <p:nvSpPr>
+          <p:cNvPr id="4" name="Slide Number Placeholder 3"/>
+          <p:cNvSpPr>
+            <a:spLocks noGrp="1"/>
+          </p:cNvSpPr>
+          <p:nvPr>
+            <p:ph type="sldNum" sz="quarter" idx="10"/>
+          </p:nvPr>
+        </p:nvSpPr>
+        <p:spPr/>
+        <p:txBody>
+          <a:bodyPr/>
+          <a:lstStyle/>
+          <a:p>
+            <a:fld id="{74DE7DC8-A302-4EFB-9208-987A80C71CE4}" type="slidenum">
+              <a:rPr lang="en-US" smtClean="0"/>
+              <a:pPr/>
+              <a:t>9</a:t>
+            </a:fld>
+            <a:endParaRPr lang="en-US" dirty="0"/>
+          </a:p>
+        </p:txBody>
+      </p:sp>
+    </p:spTree>
+  </p:cSld>
+  <p:clrMapOvr>
+    <a:masterClrMapping/>
+  </p:clrMapOvr>
+</p:notes>
+</file>
+
 <file path=ppt/slideLayouts/slideLayout1.xml><?xml version="1.0" encoding="utf-8"?>
 <p:sldLayout xmlns:a="http://schemas.openxmlformats.org/drawingml/2006/main" xmlns:r="http://schemas.openxmlformats.org/officeDocument/2006/relationships" xmlns:p="http://schemas.openxmlformats.org/presentationml/2006/main" type="title" preserve="1">
   <p:cSld name="Title Slide">
@@ -948,7 +1200,7 @@
             <a:fld id="{7DDB771E-4AED-4DD3-8AA1-5D9FD2224F14}" type="datetimeFigureOut">
               <a:rPr lang="en-US" smtClean="0"/>
               <a:pPr/>
-              <a:t>6/13/2019</a:t>
+              <a:t>6/14/2019</a:t>
             </a:fld>
             <a:endParaRPr lang="en-US" dirty="0"/>
           </a:p>
@@ -1145,7 +1397,7 @@
             <a:fld id="{7DDB771E-4AED-4DD3-8AA1-5D9FD2224F14}" type="datetimeFigureOut">
               <a:rPr lang="en-US" smtClean="0"/>
               <a:pPr/>
-              <a:t>6/13/2019</a:t>
+              <a:t>6/14/2019</a:t>
             </a:fld>
             <a:endParaRPr lang="en-US" dirty="0"/>
           </a:p>
@@ -1352,7 +1604,7 @@
             <a:fld id="{7DDB771E-4AED-4DD3-8AA1-5D9FD2224F14}" type="datetimeFigureOut">
               <a:rPr lang="en-US" smtClean="0"/>
               <a:pPr/>
-              <a:t>6/13/2019</a:t>
+              <a:t>6/14/2019</a:t>
             </a:fld>
             <a:endParaRPr lang="en-US" dirty="0"/>
           </a:p>
@@ -1549,7 +1801,7 @@
             <a:fld id="{7DDB771E-4AED-4DD3-8AA1-5D9FD2224F14}" type="datetimeFigureOut">
               <a:rPr lang="en-US" smtClean="0"/>
               <a:pPr/>
-              <a:t>6/13/2019</a:t>
+              <a:t>6/14/2019</a:t>
             </a:fld>
             <a:endParaRPr lang="en-US" dirty="0"/>
           </a:p>
@@ -1822,7 +2074,7 @@
             <a:fld id="{7DDB771E-4AED-4DD3-8AA1-5D9FD2224F14}" type="datetimeFigureOut">
               <a:rPr lang="en-US" smtClean="0"/>
               <a:pPr/>
-              <a:t>6/13/2019</a:t>
+              <a:t>6/14/2019</a:t>
             </a:fld>
             <a:endParaRPr lang="en-US" dirty="0"/>
           </a:p>
@@ -2137,7 +2389,7 @@
             <a:fld id="{7DDB771E-4AED-4DD3-8AA1-5D9FD2224F14}" type="datetimeFigureOut">
               <a:rPr lang="en-US" smtClean="0"/>
               <a:pPr/>
-              <a:t>6/13/2019</a:t>
+              <a:t>6/14/2019</a:t>
             </a:fld>
             <a:endParaRPr lang="en-US" dirty="0"/>
           </a:p>
@@ -2586,7 +2838,7 @@
             <a:fld id="{7DDB771E-4AED-4DD3-8AA1-5D9FD2224F14}" type="datetimeFigureOut">
               <a:rPr lang="en-US" smtClean="0"/>
               <a:pPr/>
-              <a:t>6/13/2019</a:t>
+              <a:t>6/14/2019</a:t>
             </a:fld>
             <a:endParaRPr lang="en-US" dirty="0"/>
           </a:p>
@@ -2731,7 +2983,7 @@
             <a:fld id="{7DDB771E-4AED-4DD3-8AA1-5D9FD2224F14}" type="datetimeFigureOut">
               <a:rPr lang="en-US" smtClean="0"/>
               <a:pPr/>
-              <a:t>6/13/2019</a:t>
+              <a:t>6/14/2019</a:t>
             </a:fld>
             <a:endParaRPr lang="en-US" dirty="0"/>
           </a:p>
@@ -2853,7 +3105,7 @@
             <a:fld id="{7DDB771E-4AED-4DD3-8AA1-5D9FD2224F14}" type="datetimeFigureOut">
               <a:rPr lang="en-US" smtClean="0"/>
               <a:pPr/>
-              <a:t>6/13/2019</a:t>
+              <a:t>6/14/2019</a:t>
             </a:fld>
             <a:endParaRPr lang="en-US" dirty="0"/>
           </a:p>
@@ -3157,7 +3409,7 @@
             <a:fld id="{7DDB771E-4AED-4DD3-8AA1-5D9FD2224F14}" type="datetimeFigureOut">
               <a:rPr lang="en-US" smtClean="0"/>
               <a:pPr/>
-              <a:t>6/13/2019</a:t>
+              <a:t>6/14/2019</a:t>
             </a:fld>
             <a:endParaRPr lang="en-US" dirty="0"/>
           </a:p>
@@ -3437,7 +3689,7 @@
             <a:fld id="{7DDB771E-4AED-4DD3-8AA1-5D9FD2224F14}" type="datetimeFigureOut">
               <a:rPr lang="en-US" smtClean="0"/>
               <a:pPr/>
-              <a:t>6/13/2019</a:t>
+              <a:t>6/14/2019</a:t>
             </a:fld>
             <a:endParaRPr lang="en-US" dirty="0"/>
           </a:p>
@@ -3677,7 +3929,7 @@
             <a:fld id="{7DDB771E-4AED-4DD3-8AA1-5D9FD2224F14}" type="datetimeFigureOut">
               <a:rPr lang="en-US" smtClean="0"/>
               <a:pPr/>
-              <a:t>6/13/2019</a:t>
+              <a:t>6/14/2019</a:t>
             </a:fld>
             <a:endParaRPr lang="en-US" dirty="0"/>
           </a:p>
@@ -4209,6 +4461,176 @@
 </p:sld>
 </file>
 
+<file path=ppt/slides/slide10.xml><?xml version="1.0" encoding="utf-8"?>
+<p:sld xmlns:a="http://schemas.openxmlformats.org/drawingml/2006/main" xmlns:r="http://schemas.openxmlformats.org/officeDocument/2006/relationships" xmlns:p="http://schemas.openxmlformats.org/presentationml/2006/main">
+  <p:cSld>
+    <p:spTree>
+      <p:nvGrpSpPr>
+        <p:cNvPr id="1" name=""/>
+        <p:cNvGrpSpPr/>
+        <p:nvPr/>
+      </p:nvGrpSpPr>
+      <p:grpSpPr>
+        <a:xfrm>
+          <a:off x="0" y="0"/>
+          <a:ext cx="0" cy="0"/>
+          <a:chOff x="0" y="0"/>
+          <a:chExt cx="0" cy="0"/>
+        </a:xfrm>
+      </p:grpSpPr>
+      <p:sp>
+        <p:nvSpPr>
+          <p:cNvPr id="5" name="TextBox 4"/>
+          <p:cNvSpPr txBox="1"/>
+          <p:nvPr/>
+        </p:nvSpPr>
+        <p:spPr>
+          <a:xfrm>
+            <a:off x="606829" y="1371600"/>
+            <a:ext cx="7880466" cy="3693319"/>
+          </a:xfrm>
+          <a:prstGeom prst="rect">
+            <a:avLst/>
+          </a:prstGeom>
+          <a:noFill/>
+        </p:spPr>
+        <p:txBody>
+          <a:bodyPr wrap="square" rtlCol="0">
+            <a:spAutoFit/>
+          </a:bodyPr>
+          <a:lstStyle/>
+          <a:p>
+            <a:r>
+              <a:rPr lang="en-US" dirty="0" smtClean="0"/>
+              <a:t>AWS EKS QuickStart</a:t>
+            </a:r>
+          </a:p>
+          <a:p>
+            <a:r>
+              <a:rPr lang="en-US" dirty="0" smtClean="0"/>
+              <a:t>https</a:t>
+            </a:r>
+            <a:r>
+              <a:rPr lang="en-US" dirty="0"/>
+              <a:t>://</a:t>
+            </a:r>
+            <a:r>
+              <a:rPr lang="en-US" dirty="0" smtClean="0"/>
+              <a:t>github.com/kskalvar/aws-eks-cluster-quickstart</a:t>
+            </a:r>
+            <a:endParaRPr lang="en-US" dirty="0"/>
+          </a:p>
+          <a:p>
+            <a:endParaRPr lang="en-US" dirty="0" smtClean="0"/>
+          </a:p>
+          <a:p>
+            <a:r>
+              <a:rPr lang="en-US" dirty="0" smtClean="0"/>
+              <a:t>AWS Summit Slides for EKS</a:t>
+            </a:r>
+          </a:p>
+          <a:p>
+            <a:r>
+              <a:rPr lang="en-US" dirty="0" smtClean="0"/>
+              <a:t>https</a:t>
+            </a:r>
+            <a:r>
+              <a:rPr lang="en-US" dirty="0"/>
+              <a:t>://</a:t>
+            </a:r>
+            <a:r>
+              <a:rPr lang="en-US" dirty="0" smtClean="0"/>
+              <a:t>www.slideshare.net/AmazonWebServices/srv318-running-kubernetes-with-amazon-eks</a:t>
+            </a:r>
+          </a:p>
+          <a:p>
+            <a:endParaRPr lang="en-US" dirty="0" smtClean="0"/>
+          </a:p>
+          <a:p>
+            <a:r>
+              <a:rPr lang="en-US" dirty="0" smtClean="0"/>
+              <a:t>Kubernetes </a:t>
+            </a:r>
+            <a:endParaRPr lang="en-US" dirty="0"/>
+          </a:p>
+          <a:p>
+            <a:r>
+              <a:rPr lang="en-US" dirty="0"/>
+              <a:t>https://</a:t>
+            </a:r>
+            <a:r>
+              <a:rPr lang="en-US" dirty="0" smtClean="0"/>
+              <a:t>kubernetes.io</a:t>
+            </a:r>
+          </a:p>
+          <a:p>
+            <a:endParaRPr lang="en-US" dirty="0" smtClean="0"/>
+          </a:p>
+          <a:p>
+            <a:r>
+              <a:rPr lang="en-US" dirty="0" smtClean="0"/>
+              <a:t>AWS EKS Getting Started</a:t>
+            </a:r>
+            <a:endParaRPr lang="en-US" dirty="0"/>
+          </a:p>
+          <a:p>
+            <a:r>
+              <a:rPr lang="en-US" dirty="0"/>
+              <a:t>https://</a:t>
+            </a:r>
+            <a:r>
+              <a:rPr lang="en-US" dirty="0" smtClean="0"/>
+              <a:t>docs.aws.amazon.com/eks/latest/userguide/getting-started.html</a:t>
+            </a:r>
+          </a:p>
+          <a:p>
+            <a:endParaRPr lang="en-US" dirty="0" smtClean="0"/>
+          </a:p>
+        </p:txBody>
+      </p:sp>
+      <p:sp>
+        <p:nvSpPr>
+          <p:cNvPr id="7" name="Title 1"/>
+          <p:cNvSpPr>
+            <a:spLocks noGrp="1"/>
+          </p:cNvSpPr>
+          <p:nvPr>
+            <p:ph type="title"/>
+          </p:nvPr>
+        </p:nvSpPr>
+        <p:spPr>
+          <a:xfrm>
+            <a:off x="457200" y="274638"/>
+            <a:ext cx="8229600" cy="1143000"/>
+          </a:xfrm>
+        </p:spPr>
+        <p:txBody>
+          <a:bodyPr/>
+          <a:lstStyle/>
+          <a:p>
+            <a:r>
+              <a:rPr lang="en-US" dirty="0" smtClean="0"/>
+              <a:t>References</a:t>
+            </a:r>
+            <a:endParaRPr lang="en-US" dirty="0"/>
+          </a:p>
+        </p:txBody>
+      </p:sp>
+    </p:spTree>
+  </p:cSld>
+  <p:clrMapOvr>
+    <a:masterClrMapping/>
+  </p:clrMapOvr>
+  <p:timing>
+    <p:tnLst>
+      <p:par>
+        <p:cTn id="1" dur="indefinite" restart="never" nodeType="tmRoot"/>
+      </p:par>
+    </p:tnLst>
+  </p:timing>
+</p:sld>
+</file>
+
 <file path=ppt/slides/slide2.xml><?xml version="1.0" encoding="utf-8"?>
 <p:sld xmlns:a="http://schemas.openxmlformats.org/drawingml/2006/main" xmlns:r="http://schemas.openxmlformats.org/officeDocument/2006/relationships" xmlns:p="http://schemas.openxmlformats.org/presentationml/2006/main">
   <p:cSld>
@@ -4709,12 +5131,12 @@
               <a:t>  An EC2 Instance in which to install kubectl, </a:t>
             </a:r>
             <a:r>
-              <a:rPr lang="en-US" dirty="0"/>
-              <a:t>aws-iam-authenticator, </a:t>
-            </a:r>
-            <a:r>
-              <a:rPr lang="en-US" dirty="0" smtClean="0"/>
-              <a:t>and aws cli version 1.15.x or greater</a:t>
+              <a:rPr lang="en-US" dirty="0" smtClean="0"/>
+              <a:t>aws-iam-authenticator, aws </a:t>
+            </a:r>
+            <a:r>
+              <a:rPr lang="en-US" dirty="0" smtClean="0"/>
+              <a:t>cli version 1.15.x or greater</a:t>
             </a:r>
           </a:p>
           <a:p>
@@ -5153,16 +5575,14 @@
         </p:nvSpPr>
         <p:spPr/>
         <p:txBody>
-          <a:bodyPr/>
-          <a:lstStyle/>
-          <a:p>
-            <a:r>
-              <a:rPr lang="en-US" dirty="0" smtClean="0"/>
-              <a:t>Installation </a:t>
-            </a:r>
-            <a:r>
-              <a:rPr lang="en-US" dirty="0" smtClean="0"/>
-              <a:t>Steps</a:t>
+          <a:bodyPr>
+            <a:normAutofit/>
+          </a:bodyPr>
+          <a:lstStyle/>
+          <a:p>
+            <a:r>
+              <a:rPr lang="en-US" dirty="0" smtClean="0"/>
+              <a:t>Disclaimer</a:t>
             </a:r>
             <a:endParaRPr lang="en-US" dirty="0"/>
           </a:p>
@@ -5177,7 +5597,7 @@
         <p:spPr>
           <a:xfrm>
             <a:off x="879894" y="1584186"/>
-            <a:ext cx="7608651" cy="1477328"/>
+            <a:ext cx="7608651" cy="923330"/>
           </a:xfrm>
           <a:prstGeom prst="rect">
             <a:avLst/>
@@ -5196,65 +5616,16 @@
             </a:pPr>
             <a:r>
               <a:rPr lang="en-US" dirty="0" smtClean="0"/>
-              <a:t>  </a:t>
-            </a:r>
-            <a:r>
-              <a:rPr lang="en-US" dirty="0" smtClean="0"/>
-              <a:t>Configure </a:t>
+              <a:t>Note</a:t>
             </a:r>
             <a:r>
               <a:rPr lang="en-US" dirty="0"/>
-              <a:t>Your AWS EC2 Instance  </a:t>
-            </a:r>
-          </a:p>
-          <a:p>
-            <a:pPr marL="285750" indent="-285750">
-              <a:buFont typeface="Arial" pitchFamily="34" charset="0"/>
-              <a:buChar char="•"/>
-            </a:pPr>
-            <a:r>
-              <a:rPr lang="en-US" dirty="0"/>
-              <a:t>  Create AWS EKS Cluster using AWS CloudFormation  </a:t>
-            </a:r>
-          </a:p>
-          <a:p>
-            <a:pPr marL="285750" indent="-285750">
-              <a:buFont typeface="Arial" pitchFamily="34" charset="0"/>
-              <a:buChar char="•"/>
-            </a:pPr>
-            <a:r>
-              <a:rPr lang="en-US" dirty="0"/>
-              <a:t>  Configure kubectl on Your EC2 Instance   </a:t>
-            </a:r>
-          </a:p>
-          <a:p>
-            <a:pPr marL="285750" indent="-285750">
-              <a:buFont typeface="Arial" pitchFamily="34" charset="0"/>
-              <a:buChar char="•"/>
-            </a:pPr>
-            <a:r>
-              <a:rPr lang="en-US" dirty="0"/>
-              <a:t>  Deploy </a:t>
-            </a:r>
-            <a:r>
-              <a:rPr lang="en-US" dirty="0" smtClean="0"/>
-              <a:t>Web App </a:t>
-            </a:r>
-            <a:r>
-              <a:rPr lang="en-US" dirty="0"/>
-              <a:t>to Your Cluster  </a:t>
-            </a:r>
-          </a:p>
-          <a:p>
-            <a:pPr marL="285750" indent="-285750">
-              <a:buFont typeface="Arial" pitchFamily="34" charset="0"/>
-              <a:buChar char="•"/>
-            </a:pPr>
-            <a:r>
-              <a:rPr lang="en-US" dirty="0"/>
-              <a:t>  Configure the Kubernetes Dashboard (optional)</a:t>
-            </a:r>
-            <a:endParaRPr lang="en-US" dirty="0" smtClean="0"/>
+              <a:t>:  This </a:t>
+            </a:r>
+            <a:r>
+              <a:rPr lang="en-US" dirty="0" smtClean="0"/>
+              <a:t>is the first time this code lab has been done.  Artifacts should be publicly available, if not just follow along and you can do this on your own at home.  All instructions are captured in GitHub.</a:t>
+            </a:r>
           </a:p>
         </p:txBody>
       </p:sp>
@@ -5292,14 +5663,39 @@
       </p:grpSpPr>
       <p:sp>
         <p:nvSpPr>
+          <p:cNvPr id="3" name="Title 1"/>
+          <p:cNvSpPr>
+            <a:spLocks noGrp="1"/>
+          </p:cNvSpPr>
+          <p:nvPr>
+            <p:ph type="title"/>
+          </p:nvPr>
+        </p:nvSpPr>
+        <p:spPr/>
+        <p:txBody>
+          <a:bodyPr>
+            <a:normAutofit/>
+          </a:bodyPr>
+          <a:lstStyle/>
+          <a:p>
+            <a:r>
+              <a:rPr lang="en-US" dirty="0" smtClean="0"/>
+              <a:t>Code Lab Requirements</a:t>
+            </a:r>
+            <a:endParaRPr lang="en-US" dirty="0"/>
+          </a:p>
+        </p:txBody>
+      </p:sp>
+      <p:sp>
+        <p:nvSpPr>
           <p:cNvPr id="5" name="TextBox 4"/>
           <p:cNvSpPr txBox="1"/>
           <p:nvPr/>
         </p:nvSpPr>
         <p:spPr>
           <a:xfrm>
-            <a:off x="606829" y="1371600"/>
-            <a:ext cx="7880466" cy="3693319"/>
+            <a:off x="879894" y="1584186"/>
+            <a:ext cx="7608651" cy="1477328"/>
           </a:xfrm>
           <a:prstGeom prst="rect">
             <a:avLst/>
@@ -5312,123 +5708,243 @@
           </a:bodyPr>
           <a:lstStyle/>
           <a:p>
-            <a:r>
-              <a:rPr lang="en-US" dirty="0" smtClean="0"/>
-              <a:t>AWS EKS QuickStart</a:t>
-            </a:r>
-          </a:p>
-          <a:p>
-            <a:r>
-              <a:rPr lang="en-US" dirty="0" smtClean="0"/>
-              <a:t>https</a:t>
+            <a:pPr marL="285750" indent="-285750">
+              <a:buFont typeface="Arial" pitchFamily="34" charset="0"/>
+              <a:buChar char="•"/>
+            </a:pPr>
+            <a:r>
+              <a:rPr lang="en-US" dirty="0" smtClean="0"/>
+              <a:t>Note</a:t>
             </a:r>
             <a:r>
               <a:rPr lang="en-US" dirty="0"/>
-              <a:t>://</a:t>
-            </a:r>
-            <a:r>
-              <a:rPr lang="en-US" dirty="0" smtClean="0"/>
-              <a:t>github.com/kskalvar/aws-eks-cluster-quickstart</a:t>
+              <a:t>:  This how-to assumes you </a:t>
+            </a:r>
+            <a:r>
+              <a:rPr lang="en-US" dirty="0" smtClean="0"/>
+              <a:t>are:</a:t>
+            </a:r>
+          </a:p>
+          <a:p>
+            <a:pPr marL="742950" lvl="1" indent="-285750">
+              <a:buFont typeface="Arial" pitchFamily="34" charset="0"/>
+              <a:buChar char="•"/>
+            </a:pPr>
+            <a:r>
+              <a:rPr lang="en-US" dirty="0" smtClean="0"/>
+              <a:t>Creating </a:t>
+            </a:r>
+            <a:r>
+              <a:rPr lang="en-US" dirty="0"/>
+              <a:t>the eks cluster in us-east-1, </a:t>
+            </a:r>
+            <a:endParaRPr lang="en-US" dirty="0" smtClean="0"/>
+          </a:p>
+          <a:p>
+            <a:pPr marL="742950" lvl="1" indent="-285750">
+              <a:buFont typeface="Arial" pitchFamily="34" charset="0"/>
+              <a:buChar char="•"/>
+            </a:pPr>
+            <a:r>
+              <a:rPr lang="en-US" dirty="0" smtClean="0"/>
+              <a:t>You </a:t>
+            </a:r>
+            <a:r>
+              <a:rPr lang="en-US" dirty="0"/>
+              <a:t>have access to your AWS Root Account</a:t>
+            </a:r>
+            <a:r>
+              <a:rPr lang="en-US" dirty="0" smtClean="0"/>
+              <a:t>,</a:t>
+            </a:r>
+          </a:p>
+          <a:p>
+            <a:pPr marL="742950" lvl="1" indent="-285750">
+              <a:buFont typeface="Arial" pitchFamily="34" charset="0"/>
+              <a:buChar char="•"/>
+            </a:pPr>
+            <a:r>
+              <a:rPr lang="en-US" dirty="0" smtClean="0"/>
+              <a:t>You </a:t>
+            </a:r>
+            <a:r>
+              <a:rPr lang="en-US" dirty="0"/>
+              <a:t>know how to create an EC2 Instance</a:t>
+            </a:r>
+            <a:r>
+              <a:rPr lang="en-US" dirty="0" smtClean="0"/>
+              <a:t>,</a:t>
+            </a:r>
+          </a:p>
+          <a:p>
+            <a:pPr marL="742950" lvl="1" indent="-285750">
+              <a:buFont typeface="Arial" pitchFamily="34" charset="0"/>
+              <a:buChar char="•"/>
+            </a:pPr>
+            <a:r>
+              <a:rPr lang="en-US" dirty="0" smtClean="0"/>
+              <a:t>And </a:t>
+            </a:r>
+            <a:r>
+              <a:rPr lang="en-US" dirty="0"/>
+              <a:t>can login to the instance from your laptop.</a:t>
+            </a:r>
+            <a:endParaRPr lang="en-US" dirty="0" smtClean="0"/>
+          </a:p>
+        </p:txBody>
+      </p:sp>
+    </p:spTree>
+    <p:extLst>
+      <p:ext uri="{BB962C8B-B14F-4D97-AF65-F5344CB8AC3E}">
+        <p14:creationId xmlns:p14="http://schemas.microsoft.com/office/powerpoint/2010/main" val="606823512"/>
+      </p:ext>
+    </p:extLst>
+  </p:cSld>
+  <p:clrMapOvr>
+    <a:masterClrMapping/>
+  </p:clrMapOvr>
+  <p:timing>
+    <p:tnLst>
+      <p:par>
+        <p:cTn id="1" dur="indefinite" restart="never" nodeType="tmRoot"/>
+      </p:par>
+    </p:tnLst>
+  </p:timing>
+</p:sld>
+</file>
+
+<file path=ppt/slides/slide9.xml><?xml version="1.0" encoding="utf-8"?>
+<p:sld xmlns:a="http://schemas.openxmlformats.org/drawingml/2006/main" xmlns:r="http://schemas.openxmlformats.org/officeDocument/2006/relationships" xmlns:p="http://schemas.openxmlformats.org/presentationml/2006/main">
+  <p:cSld>
+    <p:spTree>
+      <p:nvGrpSpPr>
+        <p:cNvPr id="1" name=""/>
+        <p:cNvGrpSpPr/>
+        <p:nvPr/>
+      </p:nvGrpSpPr>
+      <p:grpSpPr>
+        <a:xfrm>
+          <a:off x="0" y="0"/>
+          <a:ext cx="0" cy="0"/>
+          <a:chOff x="0" y="0"/>
+          <a:chExt cx="0" cy="0"/>
+        </a:xfrm>
+      </p:grpSpPr>
+      <p:sp>
+        <p:nvSpPr>
+          <p:cNvPr id="3" name="Title 1"/>
+          <p:cNvSpPr>
+            <a:spLocks noGrp="1"/>
+          </p:cNvSpPr>
+          <p:nvPr>
+            <p:ph type="title"/>
+          </p:nvPr>
+        </p:nvSpPr>
+        <p:spPr/>
+        <p:txBody>
+          <a:bodyPr/>
+          <a:lstStyle/>
+          <a:p>
+            <a:r>
+              <a:rPr lang="en-US" dirty="0" smtClean="0"/>
+              <a:t>Installation Steps</a:t>
             </a:r>
             <a:endParaRPr lang="en-US" dirty="0"/>
           </a:p>
-          <a:p>
-            <a:endParaRPr lang="en-US" dirty="0" smtClean="0"/>
-          </a:p>
-          <a:p>
-            <a:r>
-              <a:rPr lang="en-US" dirty="0" smtClean="0"/>
-              <a:t>AWS Summit Slides for EKS</a:t>
-            </a:r>
-          </a:p>
-          <a:p>
-            <a:r>
-              <a:rPr lang="en-US" dirty="0" smtClean="0"/>
-              <a:t>https</a:t>
-            </a:r>
-            <a:r>
-              <a:rPr lang="en-US" dirty="0"/>
-              <a:t>://</a:t>
-            </a:r>
-            <a:r>
-              <a:rPr lang="en-US" dirty="0" smtClean="0"/>
-              <a:t>www.slideshare.net/AmazonWebServices/srv318-running-kubernetes-with-amazon-eks</a:t>
-            </a:r>
-          </a:p>
-          <a:p>
-            <a:endParaRPr lang="en-US" dirty="0" smtClean="0"/>
-          </a:p>
-          <a:p>
-            <a:r>
-              <a:rPr lang="en-US" dirty="0" smtClean="0"/>
-              <a:t>Kubernetes </a:t>
-            </a:r>
-            <a:endParaRPr lang="en-US" dirty="0"/>
-          </a:p>
-          <a:p>
-            <a:r>
-              <a:rPr lang="en-US" dirty="0"/>
-              <a:t>https://</a:t>
-            </a:r>
-            <a:r>
-              <a:rPr lang="en-US" dirty="0" smtClean="0"/>
-              <a:t>kubernetes.io</a:t>
-            </a:r>
-          </a:p>
-          <a:p>
-            <a:endParaRPr lang="en-US" dirty="0" smtClean="0"/>
-          </a:p>
-          <a:p>
-            <a:r>
-              <a:rPr lang="en-US" dirty="0" smtClean="0"/>
-              <a:t>AWS EKS Getting Started</a:t>
-            </a:r>
-            <a:endParaRPr lang="en-US" dirty="0"/>
-          </a:p>
-          <a:p>
-            <a:r>
-              <a:rPr lang="en-US" dirty="0"/>
-              <a:t>https://</a:t>
-            </a:r>
-            <a:r>
-              <a:rPr lang="en-US" dirty="0" smtClean="0"/>
-              <a:t>docs.aws.amazon.com/eks/latest/userguide/getting-started.html</a:t>
-            </a:r>
-          </a:p>
-          <a:p>
-            <a:endParaRPr lang="en-US" dirty="0" smtClean="0"/>
-          </a:p>
-        </p:txBody>
-      </p:sp>
-      <p:sp>
-        <p:nvSpPr>
-          <p:cNvPr id="7" name="Title 1"/>
-          <p:cNvSpPr>
-            <a:spLocks noGrp="1"/>
-          </p:cNvSpPr>
-          <p:nvPr>
-            <p:ph type="title"/>
-          </p:nvPr>
+        </p:txBody>
+      </p:sp>
+      <p:sp>
+        <p:nvSpPr>
+          <p:cNvPr id="5" name="TextBox 4"/>
+          <p:cNvSpPr txBox="1"/>
+          <p:nvPr/>
         </p:nvSpPr>
         <p:spPr>
           <a:xfrm>
-            <a:off x="457200" y="274638"/>
-            <a:ext cx="8229600" cy="1143000"/>
+            <a:off x="879894" y="1584186"/>
+            <a:ext cx="7608651" cy="1477328"/>
           </a:xfrm>
+          <a:prstGeom prst="rect">
+            <a:avLst/>
+          </a:prstGeom>
+          <a:noFill/>
         </p:spPr>
         <p:txBody>
-          <a:bodyPr/>
-          <a:lstStyle/>
-          <a:p>
-            <a:r>
-              <a:rPr lang="en-US" dirty="0" smtClean="0"/>
-              <a:t>References</a:t>
-            </a:r>
-            <a:endParaRPr lang="en-US" dirty="0"/>
+          <a:bodyPr wrap="square" rtlCol="0">
+            <a:spAutoFit/>
+          </a:bodyPr>
+          <a:lstStyle/>
+          <a:p>
+            <a:pPr marL="285750" indent="-285750">
+              <a:buFont typeface="Arial" pitchFamily="34" charset="0"/>
+              <a:buChar char="•"/>
+            </a:pPr>
+            <a:r>
+              <a:rPr lang="en-US" dirty="0" smtClean="0"/>
+              <a:t>  Configure </a:t>
+            </a:r>
+            <a:r>
+              <a:rPr lang="en-US" dirty="0"/>
+              <a:t>Your AWS EC2 Instance  </a:t>
+            </a:r>
+          </a:p>
+          <a:p>
+            <a:pPr marL="285750" indent="-285750">
+              <a:buFont typeface="Arial" pitchFamily="34" charset="0"/>
+              <a:buChar char="•"/>
+            </a:pPr>
+            <a:r>
+              <a:rPr lang="en-US" dirty="0"/>
+              <a:t>  Create AWS EKS Cluster using AWS CloudFormation  </a:t>
+            </a:r>
+          </a:p>
+          <a:p>
+            <a:pPr marL="285750" indent="-285750">
+              <a:buFont typeface="Arial" pitchFamily="34" charset="0"/>
+              <a:buChar char="•"/>
+            </a:pPr>
+            <a:r>
+              <a:rPr lang="en-US" dirty="0"/>
+              <a:t>  Configure kubectl on Your EC2 Instance   </a:t>
+            </a:r>
+          </a:p>
+          <a:p>
+            <a:pPr marL="285750" indent="-285750">
+              <a:buFont typeface="Arial" pitchFamily="34" charset="0"/>
+              <a:buChar char="•"/>
+            </a:pPr>
+            <a:r>
+              <a:rPr lang="en-US" dirty="0"/>
+              <a:t>  Deploy </a:t>
+            </a:r>
+            <a:r>
+              <a:rPr lang="en-US" dirty="0" smtClean="0"/>
+              <a:t>Web App </a:t>
+            </a:r>
+            <a:r>
+              <a:rPr lang="en-US" dirty="0"/>
+              <a:t>to Your Cluster  </a:t>
+            </a:r>
+          </a:p>
+          <a:p>
+            <a:pPr marL="285750" indent="-285750">
+              <a:buFont typeface="Arial" pitchFamily="34" charset="0"/>
+              <a:buChar char="•"/>
+            </a:pPr>
+            <a:r>
+              <a:rPr lang="en-US" dirty="0"/>
+              <a:t>  Configure the Kubernetes Dashboard (optional)</a:t>
+            </a:r>
+            <a:endParaRPr lang="en-US" dirty="0" smtClean="0"/>
           </a:p>
         </p:txBody>
       </p:sp>
     </p:spTree>
+    <p:extLst>
+      <p:ext uri="{BB962C8B-B14F-4D97-AF65-F5344CB8AC3E}">
+        <p14:creationId xmlns:p14="http://schemas.microsoft.com/office/powerpoint/2010/main" val="3297920476"/>
+      </p:ext>
+    </p:extLst>
   </p:cSld>
   <p:clrMapOvr>
     <a:masterClrMapping/>

</xml_diff>